<commit_message>
fixed fragment on slide
</commit_message>
<xml_diff>
--- a/Architecture/gpu_memory_hierarchy/lecture_slides.pptx
+++ b/Architecture/gpu_memory_hierarchy/lecture_slides.pptx
@@ -118,6 +118,11 @@
       </a:defRPr>
     </a:lvl9pPr>
   </p:defaultTextStyle>
+  <p:extLst>
+    <p:ext uri="{EFAFB233-063F-42B5-8137-9DF3F51BA10A}">
+      <p15:sldGuideLst xmlns:p15="http://schemas.microsoft.com/office/powerpoint/2012/main"/>
+    </p:ext>
+  </p:extLst>
 </p:presentation>
 </file>
 
@@ -268,7 +273,7 @@
           <a:p>
             <a:fld id="{C7F811A2-4575-CD44-AC4D-BA49B8D6E23A}" type="datetimeFigureOut">
               <a:rPr lang="en-US" smtClean="0"/>
-              <a:t>8/9/20</a:t>
+              <a:t>10/25/20</a:t>
             </a:fld>
             <a:endParaRPr lang="en-US"/>
           </a:p>
@@ -466,7 +471,7 @@
           <a:p>
             <a:fld id="{C7F811A2-4575-CD44-AC4D-BA49B8D6E23A}" type="datetimeFigureOut">
               <a:rPr lang="en-US" smtClean="0"/>
-              <a:t>8/9/20</a:t>
+              <a:t>10/25/20</a:t>
             </a:fld>
             <a:endParaRPr lang="en-US"/>
           </a:p>
@@ -674,7 +679,7 @@
           <a:p>
             <a:fld id="{C7F811A2-4575-CD44-AC4D-BA49B8D6E23A}" type="datetimeFigureOut">
               <a:rPr lang="en-US" smtClean="0"/>
-              <a:t>8/9/20</a:t>
+              <a:t>10/25/20</a:t>
             </a:fld>
             <a:endParaRPr lang="en-US"/>
           </a:p>
@@ -872,7 +877,7 @@
           <a:p>
             <a:fld id="{C7F811A2-4575-CD44-AC4D-BA49B8D6E23A}" type="datetimeFigureOut">
               <a:rPr lang="en-US" smtClean="0"/>
-              <a:t>8/9/20</a:t>
+              <a:t>10/25/20</a:t>
             </a:fld>
             <a:endParaRPr lang="en-US"/>
           </a:p>
@@ -1147,7 +1152,7 @@
           <a:p>
             <a:fld id="{C7F811A2-4575-CD44-AC4D-BA49B8D6E23A}" type="datetimeFigureOut">
               <a:rPr lang="en-US" smtClean="0"/>
-              <a:t>8/9/20</a:t>
+              <a:t>10/25/20</a:t>
             </a:fld>
             <a:endParaRPr lang="en-US"/>
           </a:p>
@@ -1412,7 +1417,7 @@
           <a:p>
             <a:fld id="{C7F811A2-4575-CD44-AC4D-BA49B8D6E23A}" type="datetimeFigureOut">
               <a:rPr lang="en-US" smtClean="0"/>
-              <a:t>8/9/20</a:t>
+              <a:t>10/25/20</a:t>
             </a:fld>
             <a:endParaRPr lang="en-US"/>
           </a:p>
@@ -1824,7 +1829,7 @@
           <a:p>
             <a:fld id="{C7F811A2-4575-CD44-AC4D-BA49B8D6E23A}" type="datetimeFigureOut">
               <a:rPr lang="en-US" smtClean="0"/>
-              <a:t>8/9/20</a:t>
+              <a:t>10/25/20</a:t>
             </a:fld>
             <a:endParaRPr lang="en-US"/>
           </a:p>
@@ -1965,7 +1970,7 @@
           <a:p>
             <a:fld id="{C7F811A2-4575-CD44-AC4D-BA49B8D6E23A}" type="datetimeFigureOut">
               <a:rPr lang="en-US" smtClean="0"/>
-              <a:t>8/9/20</a:t>
+              <a:t>10/25/20</a:t>
             </a:fld>
             <a:endParaRPr lang="en-US"/>
           </a:p>
@@ -2078,7 +2083,7 @@
           <a:p>
             <a:fld id="{C7F811A2-4575-CD44-AC4D-BA49B8D6E23A}" type="datetimeFigureOut">
               <a:rPr lang="en-US" smtClean="0"/>
-              <a:t>8/9/20</a:t>
+              <a:t>10/25/20</a:t>
             </a:fld>
             <a:endParaRPr lang="en-US"/>
           </a:p>
@@ -2389,7 +2394,7 @@
           <a:p>
             <a:fld id="{C7F811A2-4575-CD44-AC4D-BA49B8D6E23A}" type="datetimeFigureOut">
               <a:rPr lang="en-US" smtClean="0"/>
-              <a:t>8/9/20</a:t>
+              <a:t>10/25/20</a:t>
             </a:fld>
             <a:endParaRPr lang="en-US"/>
           </a:p>
@@ -2677,7 +2682,7 @@
           <a:p>
             <a:fld id="{C7F811A2-4575-CD44-AC4D-BA49B8D6E23A}" type="datetimeFigureOut">
               <a:rPr lang="en-US" smtClean="0"/>
-              <a:t>8/9/20</a:t>
+              <a:t>10/25/20</a:t>
             </a:fld>
             <a:endParaRPr lang="en-US"/>
           </a:p>
@@ -2918,7 +2923,7 @@
           <a:p>
             <a:fld id="{C7F811A2-4575-CD44-AC4D-BA49B8D6E23A}" type="datetimeFigureOut">
               <a:rPr lang="en-US" smtClean="0"/>
-              <a:t>8/9/20</a:t>
+              <a:t>10/25/20</a:t>
             </a:fld>
             <a:endParaRPr lang="en-US"/>
           </a:p>
@@ -10583,41 +10588,270 @@
           </a:p>
         </p:txBody>
       </p:sp>
-      <p:sp>
-        <p:nvSpPr>
-          <p:cNvPr id="16" name="TextBox 15">
-            <a:extLst>
-              <a:ext uri="{FF2B5EF4-FFF2-40B4-BE49-F238E27FC236}">
-                <a16:creationId xmlns:a16="http://schemas.microsoft.com/office/drawing/2014/main" id="{FC9FE574-5366-1548-99CC-A8B25937E460}"/>
-              </a:ext>
-            </a:extLst>
-          </p:cNvPr>
-          <p:cNvSpPr txBox="1"/>
-          <p:nvPr/>
-        </p:nvSpPr>
-        <p:spPr>
-          <a:xfrm>
-            <a:off x="2551410" y="4479010"/>
-            <a:ext cx="3219086" cy="369332"/>
-          </a:xfrm>
-          <a:prstGeom prst="rect">
-            <a:avLst/>
-          </a:prstGeom>
-          <a:noFill/>
-        </p:spPr>
-        <p:txBody>
-          <a:bodyPr wrap="none" rtlCol="0">
-            <a:spAutoFit/>
-          </a:bodyPr>
-          <a:lstStyle/>
-          <a:p>
-            <a:r>
-              <a:rPr lang="en-US" dirty="0"/>
-              <a:t>Each element of the product is </a:t>
-            </a:r>
-          </a:p>
-        </p:txBody>
-      </p:sp>
+      <mc:AlternateContent xmlns:mc="http://schemas.openxmlformats.org/markup-compatibility/2006">
+        <mc:Choice xmlns:a14="http://schemas.microsoft.com/office/drawing/2010/main" Requires="a14">
+          <p:sp>
+            <p:nvSpPr>
+              <p:cNvPr id="16" name="TextBox 15">
+                <a:extLst>
+                  <a:ext uri="{FF2B5EF4-FFF2-40B4-BE49-F238E27FC236}">
+                    <a16:creationId xmlns:a16="http://schemas.microsoft.com/office/drawing/2014/main" id="{FC9FE574-5366-1548-99CC-A8B25937E460}"/>
+                  </a:ext>
+                </a:extLst>
+              </p:cNvPr>
+              <p:cNvSpPr txBox="1"/>
+              <p:nvPr/>
+            </p:nvSpPr>
+            <p:spPr>
+              <a:xfrm>
+                <a:off x="2537878" y="4244888"/>
+                <a:ext cx="7116243" cy="1454372"/>
+              </a:xfrm>
+              <a:prstGeom prst="rect">
+                <a:avLst/>
+              </a:prstGeom>
+              <a:noFill/>
+            </p:spPr>
+            <p:txBody>
+              <a:bodyPr wrap="none" rtlCol="0">
+                <a:spAutoFit/>
+              </a:bodyPr>
+              <a:lstStyle/>
+              <a:p>
+                <a:r>
+                  <a:rPr lang="en-US" dirty="0"/>
+                  <a:t>Each element of C is the result of combining a row of A and a column of B: </a:t>
+                </a:r>
+              </a:p>
+              <a:p>
+                <a:endParaRPr lang="en-US" dirty="0"/>
+              </a:p>
+              <a:p>
+                <a14:m>
+                  <m:oMathPara xmlns:m="http://schemas.openxmlformats.org/officeDocument/2006/math">
+                    <m:oMathParaPr>
+                      <m:jc m:val="centerGroup"/>
+                    </m:oMathParaPr>
+                    <m:oMath xmlns:m="http://schemas.openxmlformats.org/officeDocument/2006/math">
+                      <m:sSub>
+                        <m:sSubPr>
+                          <m:ctrlPr>
+                            <a:rPr lang="en-US" i="1" smtClean="0">
+                              <a:latin typeface="Cambria Math" panose="02040503050406030204" pitchFamily="18" charset="0"/>
+                            </a:rPr>
+                          </m:ctrlPr>
+                        </m:sSubPr>
+                        <m:e>
+                          <m:r>
+                            <a:rPr lang="en-US" b="0" i="1" smtClean="0">
+                              <a:latin typeface="Cambria Math" panose="02040503050406030204" pitchFamily="18" charset="0"/>
+                            </a:rPr>
+                            <m:t>𝐶</m:t>
+                          </m:r>
+                        </m:e>
+                        <m:sub>
+                          <m:r>
+                            <a:rPr lang="en-US" b="0" i="1" smtClean="0">
+                              <a:latin typeface="Cambria Math" panose="02040503050406030204" pitchFamily="18" charset="0"/>
+                            </a:rPr>
+                            <m:t>𝑖</m:t>
+                          </m:r>
+                          <m:r>
+                            <a:rPr lang="en-US" b="0" i="1" smtClean="0">
+                              <a:latin typeface="Cambria Math" panose="02040503050406030204" pitchFamily="18" charset="0"/>
+                            </a:rPr>
+                            <m:t>,</m:t>
+                          </m:r>
+                          <m:r>
+                            <a:rPr lang="en-US" b="0" i="1" smtClean="0">
+                              <a:latin typeface="Cambria Math" panose="02040503050406030204" pitchFamily="18" charset="0"/>
+                            </a:rPr>
+                            <m:t>𝑗</m:t>
+                          </m:r>
+                        </m:sub>
+                      </m:sSub>
+                      <m:r>
+                        <a:rPr lang="en-US" b="0" i="1" smtClean="0">
+                          <a:latin typeface="Cambria Math" panose="02040503050406030204" pitchFamily="18" charset="0"/>
+                        </a:rPr>
+                        <m:t>= </m:t>
+                      </m:r>
+                      <m:nary>
+                        <m:naryPr>
+                          <m:chr m:val="∑"/>
+                          <m:ctrlPr>
+                            <a:rPr lang="en-US" b="0" i="1" smtClean="0">
+                              <a:latin typeface="Cambria Math" panose="02040503050406030204" pitchFamily="18" charset="0"/>
+                            </a:rPr>
+                          </m:ctrlPr>
+                        </m:naryPr>
+                        <m:sub>
+                          <m:r>
+                            <m:rPr>
+                              <m:brk m:alnAt="23"/>
+                            </m:rPr>
+                            <a:rPr lang="en-US" b="0" i="1" smtClean="0">
+                              <a:latin typeface="Cambria Math" panose="02040503050406030204" pitchFamily="18" charset="0"/>
+                            </a:rPr>
+                            <m:t>𝑘</m:t>
+                          </m:r>
+                          <m:r>
+                            <a:rPr lang="en-US" b="0" i="1" smtClean="0">
+                              <a:latin typeface="Cambria Math" panose="02040503050406030204" pitchFamily="18" charset="0"/>
+                            </a:rPr>
+                            <m:t>=1</m:t>
+                          </m:r>
+                        </m:sub>
+                        <m:sup>
+                          <m:r>
+                            <a:rPr lang="en-US" b="0" i="1" smtClean="0">
+                              <a:latin typeface="Cambria Math" panose="02040503050406030204" pitchFamily="18" charset="0"/>
+                            </a:rPr>
+                            <m:t>𝑛</m:t>
+                          </m:r>
+                        </m:sup>
+                        <m:e>
+                          <m:sSub>
+                            <m:sSubPr>
+                              <m:ctrlPr>
+                                <a:rPr lang="en-US" b="0" i="1" smtClean="0">
+                                  <a:latin typeface="Cambria Math" panose="02040503050406030204" pitchFamily="18" charset="0"/>
+                                </a:rPr>
+                              </m:ctrlPr>
+                            </m:sSubPr>
+                            <m:e>
+                              <m:r>
+                                <a:rPr lang="en-US" b="0" i="1" smtClean="0">
+                                  <a:latin typeface="Cambria Math" panose="02040503050406030204" pitchFamily="18" charset="0"/>
+                                </a:rPr>
+                                <m:t>𝐴</m:t>
+                              </m:r>
+                            </m:e>
+                            <m:sub>
+                              <m:r>
+                                <a:rPr lang="en-US" b="0" i="1" smtClean="0">
+                                  <a:latin typeface="Cambria Math" panose="02040503050406030204" pitchFamily="18" charset="0"/>
+                                </a:rPr>
+                                <m:t>𝑘</m:t>
+                              </m:r>
+                              <m:r>
+                                <a:rPr lang="en-US" b="0" i="1" smtClean="0">
+                                  <a:latin typeface="Cambria Math" panose="02040503050406030204" pitchFamily="18" charset="0"/>
+                                </a:rPr>
+                                <m:t>,</m:t>
+                              </m:r>
+                              <m:r>
+                                <a:rPr lang="en-US" b="0" i="1" smtClean="0">
+                                  <a:latin typeface="Cambria Math" panose="02040503050406030204" pitchFamily="18" charset="0"/>
+                                </a:rPr>
+                                <m:t>𝑖</m:t>
+                              </m:r>
+                            </m:sub>
+                          </m:sSub>
+                          <m:r>
+                            <a:rPr lang="en-US" b="0" i="1" smtClean="0">
+                              <a:latin typeface="Cambria Math" panose="02040503050406030204" pitchFamily="18" charset="0"/>
+                              <a:ea typeface="Cambria Math" panose="02040503050406030204" pitchFamily="18" charset="0"/>
+                            </a:rPr>
+                            <m:t>×</m:t>
+                          </m:r>
+                          <m:sSub>
+                            <m:sSubPr>
+                              <m:ctrlPr>
+                                <a:rPr lang="en-US" b="0" i="1" smtClean="0">
+                                  <a:latin typeface="Cambria Math" panose="02040503050406030204" pitchFamily="18" charset="0"/>
+                                  <a:ea typeface="Cambria Math" panose="02040503050406030204" pitchFamily="18" charset="0"/>
+                                </a:rPr>
+                              </m:ctrlPr>
+                            </m:sSubPr>
+                            <m:e>
+                              <m:r>
+                                <a:rPr lang="en-US" b="0" i="1" smtClean="0">
+                                  <a:latin typeface="Cambria Math" panose="02040503050406030204" pitchFamily="18" charset="0"/>
+                                  <a:ea typeface="Cambria Math" panose="02040503050406030204" pitchFamily="18" charset="0"/>
+                                </a:rPr>
+                                <m:t>𝐵</m:t>
+                              </m:r>
+                            </m:e>
+                            <m:sub>
+                              <m:r>
+                                <a:rPr lang="en-US" b="0" i="1" smtClean="0">
+                                  <a:latin typeface="Cambria Math" panose="02040503050406030204" pitchFamily="18" charset="0"/>
+                                  <a:ea typeface="Cambria Math" panose="02040503050406030204" pitchFamily="18" charset="0"/>
+                                </a:rPr>
+                                <m:t>𝑗</m:t>
+                              </m:r>
+                              <m:r>
+                                <a:rPr lang="en-US" b="0" i="1" smtClean="0">
+                                  <a:latin typeface="Cambria Math" panose="02040503050406030204" pitchFamily="18" charset="0"/>
+                                  <a:ea typeface="Cambria Math" panose="02040503050406030204" pitchFamily="18" charset="0"/>
+                                </a:rPr>
+                                <m:t>,</m:t>
+                              </m:r>
+                              <m:r>
+                                <a:rPr lang="en-US" b="0" i="1" smtClean="0">
+                                  <a:latin typeface="Cambria Math" panose="02040503050406030204" pitchFamily="18" charset="0"/>
+                                  <a:ea typeface="Cambria Math" panose="02040503050406030204" pitchFamily="18" charset="0"/>
+                                </a:rPr>
+                                <m:t>𝑘</m:t>
+                              </m:r>
+                            </m:sub>
+                          </m:sSub>
+                        </m:e>
+                      </m:nary>
+                    </m:oMath>
+                  </m:oMathPara>
+                </a14:m>
+                <a:endParaRPr lang="en-US" dirty="0"/>
+              </a:p>
+            </p:txBody>
+          </p:sp>
+        </mc:Choice>
+        <mc:Fallback>
+          <p:sp>
+            <p:nvSpPr>
+              <p:cNvPr id="16" name="TextBox 15">
+                <a:extLst>
+                  <a:ext uri="{FF2B5EF4-FFF2-40B4-BE49-F238E27FC236}">
+                    <a16:creationId xmlns:a16="http://schemas.microsoft.com/office/drawing/2014/main" id="{FC9FE574-5366-1548-99CC-A8B25937E460}"/>
+                  </a:ext>
+                </a:extLst>
+              </p:cNvPr>
+              <p:cNvSpPr txBox="1">
+                <a:spLocks noRot="1" noChangeAspect="1" noMove="1" noResize="1" noEditPoints="1" noAdjustHandles="1" noChangeArrowheads="1" noChangeShapeType="1" noTextEdit="1"/>
+              </p:cNvSpPr>
+              <p:nvPr/>
+            </p:nvSpPr>
+            <p:spPr>
+              <a:xfrm>
+                <a:off x="2537878" y="4244888"/>
+                <a:ext cx="7116243" cy="1454372"/>
+              </a:xfrm>
+              <a:prstGeom prst="rect">
+                <a:avLst/>
+              </a:prstGeom>
+              <a:blipFill>
+                <a:blip r:embed="rId2"/>
+                <a:stretch>
+                  <a:fillRect l="-713" t="-20690" r="-535" b="-85345"/>
+                </a:stretch>
+              </a:blipFill>
+            </p:spPr>
+            <p:txBody>
+              <a:bodyPr/>
+              <a:lstStyle/>
+              <a:p>
+                <a:r>
+                  <a:rPr lang="en-US">
+                    <a:noFill/>
+                  </a:rPr>
+                  <a:t> </a:t>
+                </a:r>
+              </a:p>
+            </p:txBody>
+          </p:sp>
+        </mc:Fallback>
+      </mc:AlternateContent>
     </p:spTree>
     <p:extLst>
       <p:ext uri="{BB962C8B-B14F-4D97-AF65-F5344CB8AC3E}">

</xml_diff>

<commit_message>
Removed unneeded argument from runTest function (left from a previous version of the code)
</commit_message>
<xml_diff>
--- a/Architecture/gpu_memory_hierarchy/lecture_slides.pptx
+++ b/Architecture/gpu_memory_hierarchy/lecture_slides.pptx
@@ -273,7 +273,7 @@
           <a:p>
             <a:fld id="{C7F811A2-4575-CD44-AC4D-BA49B8D6E23A}" type="datetimeFigureOut">
               <a:rPr lang="en-US" smtClean="0"/>
-              <a:t>10/25/20</a:t>
+              <a:t>10/26/20</a:t>
             </a:fld>
             <a:endParaRPr lang="en-US"/>
           </a:p>
@@ -471,7 +471,7 @@
           <a:p>
             <a:fld id="{C7F811A2-4575-CD44-AC4D-BA49B8D6E23A}" type="datetimeFigureOut">
               <a:rPr lang="en-US" smtClean="0"/>
-              <a:t>10/25/20</a:t>
+              <a:t>10/26/20</a:t>
             </a:fld>
             <a:endParaRPr lang="en-US"/>
           </a:p>
@@ -679,7 +679,7 @@
           <a:p>
             <a:fld id="{C7F811A2-4575-CD44-AC4D-BA49B8D6E23A}" type="datetimeFigureOut">
               <a:rPr lang="en-US" smtClean="0"/>
-              <a:t>10/25/20</a:t>
+              <a:t>10/26/20</a:t>
             </a:fld>
             <a:endParaRPr lang="en-US"/>
           </a:p>
@@ -877,7 +877,7 @@
           <a:p>
             <a:fld id="{C7F811A2-4575-CD44-AC4D-BA49B8D6E23A}" type="datetimeFigureOut">
               <a:rPr lang="en-US" smtClean="0"/>
-              <a:t>10/25/20</a:t>
+              <a:t>10/26/20</a:t>
             </a:fld>
             <a:endParaRPr lang="en-US"/>
           </a:p>
@@ -1152,7 +1152,7 @@
           <a:p>
             <a:fld id="{C7F811A2-4575-CD44-AC4D-BA49B8D6E23A}" type="datetimeFigureOut">
               <a:rPr lang="en-US" smtClean="0"/>
-              <a:t>10/25/20</a:t>
+              <a:t>10/26/20</a:t>
             </a:fld>
             <a:endParaRPr lang="en-US"/>
           </a:p>
@@ -1417,7 +1417,7 @@
           <a:p>
             <a:fld id="{C7F811A2-4575-CD44-AC4D-BA49B8D6E23A}" type="datetimeFigureOut">
               <a:rPr lang="en-US" smtClean="0"/>
-              <a:t>10/25/20</a:t>
+              <a:t>10/26/20</a:t>
             </a:fld>
             <a:endParaRPr lang="en-US"/>
           </a:p>
@@ -1829,7 +1829,7 @@
           <a:p>
             <a:fld id="{C7F811A2-4575-CD44-AC4D-BA49B8D6E23A}" type="datetimeFigureOut">
               <a:rPr lang="en-US" smtClean="0"/>
-              <a:t>10/25/20</a:t>
+              <a:t>10/26/20</a:t>
             </a:fld>
             <a:endParaRPr lang="en-US"/>
           </a:p>
@@ -1970,7 +1970,7 @@
           <a:p>
             <a:fld id="{C7F811A2-4575-CD44-AC4D-BA49B8D6E23A}" type="datetimeFigureOut">
               <a:rPr lang="en-US" smtClean="0"/>
-              <a:t>10/25/20</a:t>
+              <a:t>10/26/20</a:t>
             </a:fld>
             <a:endParaRPr lang="en-US"/>
           </a:p>
@@ -2083,7 +2083,7 @@
           <a:p>
             <a:fld id="{C7F811A2-4575-CD44-AC4D-BA49B8D6E23A}" type="datetimeFigureOut">
               <a:rPr lang="en-US" smtClean="0"/>
-              <a:t>10/25/20</a:t>
+              <a:t>10/26/20</a:t>
             </a:fld>
             <a:endParaRPr lang="en-US"/>
           </a:p>
@@ -2394,7 +2394,7 @@
           <a:p>
             <a:fld id="{C7F811A2-4575-CD44-AC4D-BA49B8D6E23A}" type="datetimeFigureOut">
               <a:rPr lang="en-US" smtClean="0"/>
-              <a:t>10/25/20</a:t>
+              <a:t>10/26/20</a:t>
             </a:fld>
             <a:endParaRPr lang="en-US"/>
           </a:p>
@@ -2682,7 +2682,7 @@
           <a:p>
             <a:fld id="{C7F811A2-4575-CD44-AC4D-BA49B8D6E23A}" type="datetimeFigureOut">
               <a:rPr lang="en-US" smtClean="0"/>
-              <a:t>10/25/20</a:t>
+              <a:t>10/26/20</a:t>
             </a:fld>
             <a:endParaRPr lang="en-US"/>
           </a:p>
@@ -2923,7 +2923,7 @@
           <a:p>
             <a:fld id="{C7F811A2-4575-CD44-AC4D-BA49B8D6E23A}" type="datetimeFigureOut">
               <a:rPr lang="en-US" smtClean="0"/>
-              <a:t>10/25/20</a:t>
+              <a:t>10/26/20</a:t>
             </a:fld>
             <a:endParaRPr lang="en-US"/>
           </a:p>
@@ -10588,8 +10588,8 @@
           </a:p>
         </p:txBody>
       </p:sp>
-      <mc:AlternateContent xmlns:mc="http://schemas.openxmlformats.org/markup-compatibility/2006">
-        <mc:Choice xmlns:a14="http://schemas.microsoft.com/office/drawing/2010/main" Requires="a14">
+      <mc:AlternateContent xmlns:mc="http://schemas.openxmlformats.org/markup-compatibility/2006" xmlns:a14="http://schemas.microsoft.com/office/drawing/2010/main">
+        <mc:Choice Requires="a14">
           <p:sp>
             <p:nvSpPr>
               <p:cNvPr id="16" name="TextBox 15">
@@ -10627,6 +10627,7 @@
                 <a:endParaRPr lang="en-US" dirty="0"/>
               </a:p>
               <a:p>
+                <a:pPr/>
                 <a14:m>
                   <m:oMathPara xmlns:m="http://schemas.openxmlformats.org/officeDocument/2006/math">
                     <m:oMathParaPr>
@@ -10807,7 +10808,7 @@
             </p:txBody>
           </p:sp>
         </mc:Choice>
-        <mc:Fallback>
+        <mc:Fallback xmlns="">
           <p:sp>
             <p:nvSpPr>
               <p:cNvPr id="16" name="TextBox 15">

</xml_diff>

<commit_message>
Replacing and improving lab.tex
</commit_message>
<xml_diff>
--- a/Architecture/gpu_memory_hierarchy/lecture_slides.pptx
+++ b/Architecture/gpu_memory_hierarchy/lecture_slides.pptx
@@ -273,7 +273,7 @@
           <a:p>
             <a:fld id="{C7F811A2-4575-CD44-AC4D-BA49B8D6E23A}" type="datetimeFigureOut">
               <a:rPr lang="en-US" smtClean="0"/>
-              <a:t>10/26/20</a:t>
+              <a:t>10/1/21</a:t>
             </a:fld>
             <a:endParaRPr lang="en-US"/>
           </a:p>
@@ -471,7 +471,7 @@
           <a:p>
             <a:fld id="{C7F811A2-4575-CD44-AC4D-BA49B8D6E23A}" type="datetimeFigureOut">
               <a:rPr lang="en-US" smtClean="0"/>
-              <a:t>10/26/20</a:t>
+              <a:t>10/1/21</a:t>
             </a:fld>
             <a:endParaRPr lang="en-US"/>
           </a:p>
@@ -679,7 +679,7 @@
           <a:p>
             <a:fld id="{C7F811A2-4575-CD44-AC4D-BA49B8D6E23A}" type="datetimeFigureOut">
               <a:rPr lang="en-US" smtClean="0"/>
-              <a:t>10/26/20</a:t>
+              <a:t>10/1/21</a:t>
             </a:fld>
             <a:endParaRPr lang="en-US"/>
           </a:p>
@@ -877,7 +877,7 @@
           <a:p>
             <a:fld id="{C7F811A2-4575-CD44-AC4D-BA49B8D6E23A}" type="datetimeFigureOut">
               <a:rPr lang="en-US" smtClean="0"/>
-              <a:t>10/26/20</a:t>
+              <a:t>10/1/21</a:t>
             </a:fld>
             <a:endParaRPr lang="en-US"/>
           </a:p>
@@ -1152,7 +1152,7 @@
           <a:p>
             <a:fld id="{C7F811A2-4575-CD44-AC4D-BA49B8D6E23A}" type="datetimeFigureOut">
               <a:rPr lang="en-US" smtClean="0"/>
-              <a:t>10/26/20</a:t>
+              <a:t>10/1/21</a:t>
             </a:fld>
             <a:endParaRPr lang="en-US"/>
           </a:p>
@@ -1417,7 +1417,7 @@
           <a:p>
             <a:fld id="{C7F811A2-4575-CD44-AC4D-BA49B8D6E23A}" type="datetimeFigureOut">
               <a:rPr lang="en-US" smtClean="0"/>
-              <a:t>10/26/20</a:t>
+              <a:t>10/1/21</a:t>
             </a:fld>
             <a:endParaRPr lang="en-US"/>
           </a:p>
@@ -1829,7 +1829,7 @@
           <a:p>
             <a:fld id="{C7F811A2-4575-CD44-AC4D-BA49B8D6E23A}" type="datetimeFigureOut">
               <a:rPr lang="en-US" smtClean="0"/>
-              <a:t>10/26/20</a:t>
+              <a:t>10/1/21</a:t>
             </a:fld>
             <a:endParaRPr lang="en-US"/>
           </a:p>
@@ -1970,7 +1970,7 @@
           <a:p>
             <a:fld id="{C7F811A2-4575-CD44-AC4D-BA49B8D6E23A}" type="datetimeFigureOut">
               <a:rPr lang="en-US" smtClean="0"/>
-              <a:t>10/26/20</a:t>
+              <a:t>10/1/21</a:t>
             </a:fld>
             <a:endParaRPr lang="en-US"/>
           </a:p>
@@ -2083,7 +2083,7 @@
           <a:p>
             <a:fld id="{C7F811A2-4575-CD44-AC4D-BA49B8D6E23A}" type="datetimeFigureOut">
               <a:rPr lang="en-US" smtClean="0"/>
-              <a:t>10/26/20</a:t>
+              <a:t>10/1/21</a:t>
             </a:fld>
             <a:endParaRPr lang="en-US"/>
           </a:p>
@@ -2394,7 +2394,7 @@
           <a:p>
             <a:fld id="{C7F811A2-4575-CD44-AC4D-BA49B8D6E23A}" type="datetimeFigureOut">
               <a:rPr lang="en-US" smtClean="0"/>
-              <a:t>10/26/20</a:t>
+              <a:t>10/1/21</a:t>
             </a:fld>
             <a:endParaRPr lang="en-US"/>
           </a:p>
@@ -2682,7 +2682,7 @@
           <a:p>
             <a:fld id="{C7F811A2-4575-CD44-AC4D-BA49B8D6E23A}" type="datetimeFigureOut">
               <a:rPr lang="en-US" smtClean="0"/>
-              <a:t>10/26/20</a:t>
+              <a:t>10/1/21</a:t>
             </a:fld>
             <a:endParaRPr lang="en-US"/>
           </a:p>
@@ -2923,7 +2923,7 @@
           <a:p>
             <a:fld id="{C7F811A2-4575-CD44-AC4D-BA49B8D6E23A}" type="datetimeFigureOut">
               <a:rPr lang="en-US" smtClean="0"/>
-              <a:t>10/26/20</a:t>
+              <a:t>10/1/21</a:t>
             </a:fld>
             <a:endParaRPr lang="en-US"/>
           </a:p>
@@ -8835,8 +8835,8 @@
         </p:nvSpPr>
         <p:spPr>
           <a:xfrm>
-            <a:off x="838200" y="5791822"/>
-            <a:ext cx="7274748" cy="523220"/>
+            <a:off x="7141198" y="4143858"/>
+            <a:ext cx="4443919" cy="954107"/>
           </a:xfrm>
           <a:prstGeom prst="rect">
             <a:avLst/>
@@ -8844,14 +8844,55 @@
           <a:noFill/>
         </p:spPr>
         <p:txBody>
-          <a:bodyPr wrap="none" rtlCol="0">
+          <a:bodyPr wrap="square" rtlCol="0">
             <a:spAutoFit/>
           </a:bodyPr>
           <a:lstStyle/>
           <a:p>
             <a:r>
               <a:rPr lang="en-US" sz="2800" dirty="0"/>
-              <a:t>Step 4: Write the value into the appropriate cell  </a:t>
+              <a:t>Step 4: Write the value into </a:t>
+            </a:r>
+          </a:p>
+          <a:p>
+            <a:r>
+              <a:rPr lang="en-US" sz="2800" dirty="0"/>
+              <a:t>       the appropriate cell  </a:t>
+            </a:r>
+          </a:p>
+        </p:txBody>
+      </p:sp>
+      <p:sp>
+        <p:nvSpPr>
+          <p:cNvPr id="6" name="TextBox 5">
+            <a:extLst>
+              <a:ext uri="{FF2B5EF4-FFF2-40B4-BE49-F238E27FC236}">
+                <a16:creationId xmlns:a16="http://schemas.microsoft.com/office/drawing/2014/main" id="{D19C86A2-9DA0-DE4F-A8A0-AC0F1A1E6D84}"/>
+              </a:ext>
+            </a:extLst>
+          </p:cNvPr>
+          <p:cNvSpPr txBox="1"/>
+          <p:nvPr/>
+        </p:nvSpPr>
+        <p:spPr>
+          <a:xfrm>
+            <a:off x="6596763" y="3965732"/>
+            <a:ext cx="775752" cy="1200329"/>
+          </a:xfrm>
+          <a:prstGeom prst="rect">
+            <a:avLst/>
+          </a:prstGeom>
+          <a:noFill/>
+        </p:spPr>
+        <p:txBody>
+          <a:bodyPr wrap="square" rtlCol="0">
+            <a:spAutoFit/>
+          </a:bodyPr>
+          <a:lstStyle/>
+          <a:p>
+            <a:r>
+              <a:rPr lang="en-US" sz="7200" dirty="0"/>
+              <a:t>}</a:t>
             </a:r>
           </a:p>
         </p:txBody>

</xml_diff>

<commit_message>
moved results slide earlier to motivate the extra work
</commit_message>
<xml_diff>
--- a/Architecture/gpu_memory_hierarchy/lecture_slides.pptx
+++ b/Architecture/gpu_memory_hierarchy/lecture_slides.pptx
@@ -13,13 +13,13 @@
     <p:sldId id="272" r:id="rId7"/>
     <p:sldId id="261" r:id="rId8"/>
     <p:sldId id="262" r:id="rId9"/>
-    <p:sldId id="264" r:id="rId10"/>
-    <p:sldId id="265" r:id="rId11"/>
-    <p:sldId id="266" r:id="rId12"/>
-    <p:sldId id="269" r:id="rId13"/>
-    <p:sldId id="268" r:id="rId14"/>
-    <p:sldId id="267" r:id="rId15"/>
-    <p:sldId id="263" r:id="rId16"/>
+    <p:sldId id="263" r:id="rId10"/>
+    <p:sldId id="264" r:id="rId11"/>
+    <p:sldId id="265" r:id="rId12"/>
+    <p:sldId id="266" r:id="rId13"/>
+    <p:sldId id="269" r:id="rId14"/>
+    <p:sldId id="268" r:id="rId15"/>
+    <p:sldId id="267" r:id="rId16"/>
   </p:sldIdLst>
   <p:sldSz cx="12192000" cy="6858000"/>
   <p:notesSz cx="6858000" cy="9144000"/>
@@ -273,7 +273,7 @@
           <a:p>
             <a:fld id="{C7F811A2-4575-CD44-AC4D-BA49B8D6E23A}" type="datetimeFigureOut">
               <a:rPr lang="en-US" smtClean="0"/>
-              <a:t>10/1/21</a:t>
+              <a:t>7/21/22</a:t>
             </a:fld>
             <a:endParaRPr lang="en-US"/>
           </a:p>
@@ -471,7 +471,7 @@
           <a:p>
             <a:fld id="{C7F811A2-4575-CD44-AC4D-BA49B8D6E23A}" type="datetimeFigureOut">
               <a:rPr lang="en-US" smtClean="0"/>
-              <a:t>10/1/21</a:t>
+              <a:t>7/21/22</a:t>
             </a:fld>
             <a:endParaRPr lang="en-US"/>
           </a:p>
@@ -679,7 +679,7 @@
           <a:p>
             <a:fld id="{C7F811A2-4575-CD44-AC4D-BA49B8D6E23A}" type="datetimeFigureOut">
               <a:rPr lang="en-US" smtClean="0"/>
-              <a:t>10/1/21</a:t>
+              <a:t>7/21/22</a:t>
             </a:fld>
             <a:endParaRPr lang="en-US"/>
           </a:p>
@@ -877,7 +877,7 @@
           <a:p>
             <a:fld id="{C7F811A2-4575-CD44-AC4D-BA49B8D6E23A}" type="datetimeFigureOut">
               <a:rPr lang="en-US" smtClean="0"/>
-              <a:t>10/1/21</a:t>
+              <a:t>7/21/22</a:t>
             </a:fld>
             <a:endParaRPr lang="en-US"/>
           </a:p>
@@ -1152,7 +1152,7 @@
           <a:p>
             <a:fld id="{C7F811A2-4575-CD44-AC4D-BA49B8D6E23A}" type="datetimeFigureOut">
               <a:rPr lang="en-US" smtClean="0"/>
-              <a:t>10/1/21</a:t>
+              <a:t>7/21/22</a:t>
             </a:fld>
             <a:endParaRPr lang="en-US"/>
           </a:p>
@@ -1417,7 +1417,7 @@
           <a:p>
             <a:fld id="{C7F811A2-4575-CD44-AC4D-BA49B8D6E23A}" type="datetimeFigureOut">
               <a:rPr lang="en-US" smtClean="0"/>
-              <a:t>10/1/21</a:t>
+              <a:t>7/21/22</a:t>
             </a:fld>
             <a:endParaRPr lang="en-US"/>
           </a:p>
@@ -1829,7 +1829,7 @@
           <a:p>
             <a:fld id="{C7F811A2-4575-CD44-AC4D-BA49B8D6E23A}" type="datetimeFigureOut">
               <a:rPr lang="en-US" smtClean="0"/>
-              <a:t>10/1/21</a:t>
+              <a:t>7/21/22</a:t>
             </a:fld>
             <a:endParaRPr lang="en-US"/>
           </a:p>
@@ -1970,7 +1970,7 @@
           <a:p>
             <a:fld id="{C7F811A2-4575-CD44-AC4D-BA49B8D6E23A}" type="datetimeFigureOut">
               <a:rPr lang="en-US" smtClean="0"/>
-              <a:t>10/1/21</a:t>
+              <a:t>7/21/22</a:t>
             </a:fld>
             <a:endParaRPr lang="en-US"/>
           </a:p>
@@ -2083,7 +2083,7 @@
           <a:p>
             <a:fld id="{C7F811A2-4575-CD44-AC4D-BA49B8D6E23A}" type="datetimeFigureOut">
               <a:rPr lang="en-US" smtClean="0"/>
-              <a:t>10/1/21</a:t>
+              <a:t>7/21/22</a:t>
             </a:fld>
             <a:endParaRPr lang="en-US"/>
           </a:p>
@@ -2394,7 +2394,7 @@
           <a:p>
             <a:fld id="{C7F811A2-4575-CD44-AC4D-BA49B8D6E23A}" type="datetimeFigureOut">
               <a:rPr lang="en-US" smtClean="0"/>
-              <a:t>10/1/21</a:t>
+              <a:t>7/21/22</a:t>
             </a:fld>
             <a:endParaRPr lang="en-US"/>
           </a:p>
@@ -2682,7 +2682,7 @@
           <a:p>
             <a:fld id="{C7F811A2-4575-CD44-AC4D-BA49B8D6E23A}" type="datetimeFigureOut">
               <a:rPr lang="en-US" smtClean="0"/>
-              <a:t>10/1/21</a:t>
+              <a:t>7/21/22</a:t>
             </a:fld>
             <a:endParaRPr lang="en-US"/>
           </a:p>
@@ -2923,7 +2923,7 @@
           <a:p>
             <a:fld id="{C7F811A2-4575-CD44-AC4D-BA49B8D6E23A}" type="datetimeFigureOut">
               <a:rPr lang="en-US" smtClean="0"/>
-              <a:t>10/1/21</a:t>
+              <a:t>7/21/22</a:t>
             </a:fld>
             <a:endParaRPr lang="en-US"/>
           </a:p>
@@ -3481,6 +3481,214 @@
         <p:spPr>
           <a:xfrm>
             <a:off x="838200" y="1825625"/>
+            <a:ext cx="10515600" cy="2963351"/>
+          </a:xfrm>
+        </p:spPr>
+        <p:txBody>
+          <a:bodyPr>
+            <a:normAutofit/>
+          </a:bodyPr>
+          <a:lstStyle/>
+          <a:p>
+            <a:pPr marL="0" indent="0">
+              <a:buNone/>
+            </a:pPr>
+            <a:r>
+              <a:rPr lang="en-US" dirty="0"/>
+              <a:t>__global__ void </a:t>
+            </a:r>
+            <a:r>
+              <a:rPr lang="en-US" dirty="0" err="1"/>
+              <a:t>tiledkernel</a:t>
+            </a:r>
+            <a:r>
+              <a:rPr lang="en-US" dirty="0"/>
+              <a:t>(float* Md, float* Nd, float* </a:t>
+            </a:r>
+            <a:r>
+              <a:rPr lang="en-US" dirty="0" err="1"/>
+              <a:t>Pd</a:t>
+            </a:r>
+            <a:r>
+              <a:rPr lang="en-US" dirty="0"/>
+              <a:t>, </a:t>
+            </a:r>
+            <a:r>
+              <a:rPr lang="en-US" dirty="0" err="1"/>
+              <a:t>int</a:t>
+            </a:r>
+            <a:r>
+              <a:rPr lang="en-US" dirty="0"/>
+              <a:t> width) {</a:t>
+            </a:r>
+          </a:p>
+          <a:p>
+            <a:pPr marL="0" indent="0">
+              <a:buNone/>
+            </a:pPr>
+            <a:r>
+              <a:rPr lang="en-US" dirty="0"/>
+              <a:t>	__shared__ float </a:t>
+            </a:r>
+            <a:r>
+              <a:rPr lang="en-US" dirty="0" err="1"/>
+              <a:t>Mds</a:t>
+            </a:r>
+            <a:r>
+              <a:rPr lang="en-US" dirty="0"/>
+              <a:t>[TILE_WIDTH][TILE_WIDTH];</a:t>
+            </a:r>
+          </a:p>
+          <a:p>
+            <a:pPr marL="0" indent="0">
+              <a:buNone/>
+            </a:pPr>
+            <a:r>
+              <a:rPr lang="en-US" dirty="0"/>
+              <a:t>	__shared__ float </a:t>
+            </a:r>
+            <a:r>
+              <a:rPr lang="en-US" dirty="0" err="1"/>
+              <a:t>Nds</a:t>
+            </a:r>
+            <a:r>
+              <a:rPr lang="en-US" dirty="0"/>
+              <a:t>[TILE_WIDTH][TILE_WIDTH];</a:t>
+            </a:r>
+          </a:p>
+          <a:p>
+            <a:pPr marL="0" indent="0">
+              <a:buNone/>
+            </a:pPr>
+            <a:r>
+              <a:rPr lang="en-US" dirty="0"/>
+              <a:t>	…</a:t>
+            </a:r>
+          </a:p>
+          <a:p>
+            <a:pPr marL="0" indent="0">
+              <a:buNone/>
+            </a:pPr>
+            <a:r>
+              <a:rPr lang="en-US" dirty="0"/>
+              <a:t>}</a:t>
+            </a:r>
+          </a:p>
+        </p:txBody>
+      </p:sp>
+      <p:sp>
+        <p:nvSpPr>
+          <p:cNvPr id="5" name="TextBox 4">
+            <a:extLst>
+              <a:ext uri="{FF2B5EF4-FFF2-40B4-BE49-F238E27FC236}">
+                <a16:creationId xmlns:a16="http://schemas.microsoft.com/office/drawing/2014/main" id="{7841AAF2-D420-8A4D-BE45-10458CEE63CF}"/>
+              </a:ext>
+            </a:extLst>
+          </p:cNvPr>
+          <p:cNvSpPr txBox="1"/>
+          <p:nvPr/>
+        </p:nvSpPr>
+        <p:spPr>
+          <a:xfrm>
+            <a:off x="838200" y="5373364"/>
+            <a:ext cx="8192884" cy="523220"/>
+          </a:xfrm>
+          <a:prstGeom prst="rect">
+            <a:avLst/>
+          </a:prstGeom>
+          <a:noFill/>
+        </p:spPr>
+        <p:txBody>
+          <a:bodyPr wrap="none" rtlCol="0">
+            <a:spAutoFit/>
+          </a:bodyPr>
+          <a:lstStyle/>
+          <a:p>
+            <a:r>
+              <a:rPr lang="en-US" sz="2800" dirty="0"/>
+              <a:t>Step 1: Allocate the cache to store a tile of each matrix </a:t>
+            </a:r>
+          </a:p>
+        </p:txBody>
+      </p:sp>
+    </p:spTree>
+    <p:extLst>
+      <p:ext uri="{BB962C8B-B14F-4D97-AF65-F5344CB8AC3E}">
+        <p14:creationId xmlns:p14="http://schemas.microsoft.com/office/powerpoint/2010/main" val="2166518724"/>
+      </p:ext>
+    </p:extLst>
+  </p:cSld>
+  <p:clrMapOvr>
+    <a:masterClrMapping/>
+  </p:clrMapOvr>
+</p:sld>
+</file>
+
+<file path=ppt/slides/slide11.xml><?xml version="1.0" encoding="utf-8"?>
+<p:sld xmlns:a="http://schemas.openxmlformats.org/drawingml/2006/main" xmlns:r="http://schemas.openxmlformats.org/officeDocument/2006/relationships" xmlns:p="http://schemas.openxmlformats.org/presentationml/2006/main">
+  <p:cSld>
+    <p:spTree>
+      <p:nvGrpSpPr>
+        <p:cNvPr id="1" name=""/>
+        <p:cNvGrpSpPr/>
+        <p:nvPr/>
+      </p:nvGrpSpPr>
+      <p:grpSpPr>
+        <a:xfrm>
+          <a:off x="0" y="0"/>
+          <a:ext cx="0" cy="0"/>
+          <a:chOff x="0" y="0"/>
+          <a:chExt cx="0" cy="0"/>
+        </a:xfrm>
+      </p:grpSpPr>
+      <p:sp>
+        <p:nvSpPr>
+          <p:cNvPr id="2" name="Title 1">
+            <a:extLst>
+              <a:ext uri="{FF2B5EF4-FFF2-40B4-BE49-F238E27FC236}">
+                <a16:creationId xmlns:a16="http://schemas.microsoft.com/office/drawing/2014/main" id="{CFB17853-D43F-0548-9D80-3FC9AA31533C}"/>
+              </a:ext>
+            </a:extLst>
+          </p:cNvPr>
+          <p:cNvSpPr>
+            <a:spLocks noGrp="1"/>
+          </p:cNvSpPr>
+          <p:nvPr>
+            <p:ph type="title"/>
+          </p:nvPr>
+        </p:nvSpPr>
+        <p:spPr/>
+        <p:txBody>
+          <a:bodyPr/>
+          <a:lstStyle/>
+          <a:p>
+            <a:pPr algn="ctr"/>
+            <a:r>
+              <a:rPr lang="en-US" dirty="0"/>
+              <a:t>Writing the tiled kernel</a:t>
+            </a:r>
+          </a:p>
+        </p:txBody>
+      </p:sp>
+      <p:sp>
+        <p:nvSpPr>
+          <p:cNvPr id="3" name="Content Placeholder 2">
+            <a:extLst>
+              <a:ext uri="{FF2B5EF4-FFF2-40B4-BE49-F238E27FC236}">
+                <a16:creationId xmlns:a16="http://schemas.microsoft.com/office/drawing/2014/main" id="{FA8D2203-C3AE-B24F-9E96-F0A4533F2282}"/>
+              </a:ext>
+            </a:extLst>
+          </p:cNvPr>
+          <p:cNvSpPr>
+            <a:spLocks noGrp="1"/>
+          </p:cNvSpPr>
+          <p:nvPr>
+            <p:ph idx="1"/>
+          </p:nvPr>
+        </p:nvSpPr>
+        <p:spPr>
+          <a:xfrm>
+            <a:off x="838200" y="1825625"/>
             <a:ext cx="10515600" cy="3366307"/>
           </a:xfrm>
         </p:spPr>
@@ -3708,7 +3916,7 @@
 </p:sld>
 </file>
 
-<file path=ppt/slides/slide11.xml><?xml version="1.0" encoding="utf-8"?>
+<file path=ppt/slides/slide12.xml><?xml version="1.0" encoding="utf-8"?>
 <p:sld xmlns:a="http://schemas.openxmlformats.org/drawingml/2006/main" xmlns:r="http://schemas.openxmlformats.org/officeDocument/2006/relationships" xmlns:p="http://schemas.openxmlformats.org/presentationml/2006/main">
   <p:cSld>
     <p:spTree>
@@ -5324,7 +5532,7 @@
 </p:sld>
 </file>
 
-<file path=ppt/slides/slide12.xml><?xml version="1.0" encoding="utf-8"?>
+<file path=ppt/slides/slide13.xml><?xml version="1.0" encoding="utf-8"?>
 <p:sld xmlns:a="http://schemas.openxmlformats.org/drawingml/2006/main" xmlns:r="http://schemas.openxmlformats.org/officeDocument/2006/relationships" xmlns:p="http://schemas.openxmlformats.org/presentationml/2006/main">
   <p:cSld>
     <p:spTree>
@@ -6942,7 +7150,7 @@
 </p:sld>
 </file>
 
-<file path=ppt/slides/slide13.xml><?xml version="1.0" encoding="utf-8"?>
+<file path=ppt/slides/slide14.xml><?xml version="1.0" encoding="utf-8"?>
 <p:sld xmlns:a="http://schemas.openxmlformats.org/drawingml/2006/main" xmlns:r="http://schemas.openxmlformats.org/officeDocument/2006/relationships" xmlns:p="http://schemas.openxmlformats.org/presentationml/2006/main">
   <p:cSld>
     <p:spTree>
@@ -8604,312 +8812,6 @@
 </p:sld>
 </file>
 
-<file path=ppt/slides/slide14.xml><?xml version="1.0" encoding="utf-8"?>
-<p:sld xmlns:a="http://schemas.openxmlformats.org/drawingml/2006/main" xmlns:r="http://schemas.openxmlformats.org/officeDocument/2006/relationships" xmlns:p="http://schemas.openxmlformats.org/presentationml/2006/main">
-  <p:cSld>
-    <p:spTree>
-      <p:nvGrpSpPr>
-        <p:cNvPr id="1" name=""/>
-        <p:cNvGrpSpPr/>
-        <p:nvPr/>
-      </p:nvGrpSpPr>
-      <p:grpSpPr>
-        <a:xfrm>
-          <a:off x="0" y="0"/>
-          <a:ext cx="0" cy="0"/>
-          <a:chOff x="0" y="0"/>
-          <a:chExt cx="0" cy="0"/>
-        </a:xfrm>
-      </p:grpSpPr>
-      <p:sp>
-        <p:nvSpPr>
-          <p:cNvPr id="2" name="Title 1">
-            <a:extLst>
-              <a:ext uri="{FF2B5EF4-FFF2-40B4-BE49-F238E27FC236}">
-                <a16:creationId xmlns:a16="http://schemas.microsoft.com/office/drawing/2014/main" id="{CFB17853-D43F-0548-9D80-3FC9AA31533C}"/>
-              </a:ext>
-            </a:extLst>
-          </p:cNvPr>
-          <p:cNvSpPr>
-            <a:spLocks noGrp="1"/>
-          </p:cNvSpPr>
-          <p:nvPr>
-            <p:ph type="title"/>
-          </p:nvPr>
-        </p:nvSpPr>
-        <p:spPr/>
-        <p:txBody>
-          <a:bodyPr/>
-          <a:lstStyle/>
-          <a:p>
-            <a:pPr algn="ctr"/>
-            <a:r>
-              <a:rPr lang="en-US" dirty="0"/>
-              <a:t>Writing the tiled kernel</a:t>
-            </a:r>
-          </a:p>
-        </p:txBody>
-      </p:sp>
-      <p:sp>
-        <p:nvSpPr>
-          <p:cNvPr id="3" name="Content Placeholder 2">
-            <a:extLst>
-              <a:ext uri="{FF2B5EF4-FFF2-40B4-BE49-F238E27FC236}">
-                <a16:creationId xmlns:a16="http://schemas.microsoft.com/office/drawing/2014/main" id="{FA8D2203-C3AE-B24F-9E96-F0A4533F2282}"/>
-              </a:ext>
-            </a:extLst>
-          </p:cNvPr>
-          <p:cNvSpPr>
-            <a:spLocks noGrp="1"/>
-          </p:cNvSpPr>
-          <p:nvPr>
-            <p:ph idx="1"/>
-          </p:nvPr>
-        </p:nvSpPr>
-        <p:spPr>
-          <a:xfrm>
-            <a:off x="838200" y="1825625"/>
-            <a:ext cx="10515600" cy="3846755"/>
-          </a:xfrm>
-        </p:spPr>
-        <p:txBody>
-          <a:bodyPr>
-            <a:normAutofit fontScale="92500" lnSpcReduction="20000"/>
-          </a:bodyPr>
-          <a:lstStyle/>
-          <a:p>
-            <a:pPr marL="0" indent="0">
-              <a:buNone/>
-            </a:pPr>
-            <a:r>
-              <a:rPr lang="en-US" dirty="0"/>
-              <a:t>__global__ void </a:t>
-            </a:r>
-            <a:r>
-              <a:rPr lang="en-US" dirty="0" err="1"/>
-              <a:t>tiledkernel</a:t>
-            </a:r>
-            <a:r>
-              <a:rPr lang="en-US" dirty="0"/>
-              <a:t>(float* Md, float* Nd, float* </a:t>
-            </a:r>
-            <a:r>
-              <a:rPr lang="en-US" dirty="0" err="1"/>
-              <a:t>Pd</a:t>
-            </a:r>
-            <a:r>
-              <a:rPr lang="en-US" dirty="0"/>
-              <a:t>, </a:t>
-            </a:r>
-            <a:r>
-              <a:rPr lang="en-US" dirty="0" err="1"/>
-              <a:t>int</a:t>
-            </a:r>
-            <a:r>
-              <a:rPr lang="en-US" dirty="0"/>
-              <a:t> width) {</a:t>
-            </a:r>
-          </a:p>
-          <a:p>
-            <a:pPr marL="0" indent="0">
-              <a:buNone/>
-            </a:pPr>
-            <a:r>
-              <a:rPr lang="en-US" dirty="0"/>
-              <a:t>	…</a:t>
-            </a:r>
-          </a:p>
-          <a:p>
-            <a:pPr marL="0" indent="0">
-              <a:buNone/>
-            </a:pPr>
-            <a:r>
-              <a:rPr lang="en-US" dirty="0"/>
-              <a:t>	 for (</a:t>
-            </a:r>
-            <a:r>
-              <a:rPr lang="en-US" dirty="0" err="1"/>
-              <a:t>int</a:t>
-            </a:r>
-            <a:r>
-              <a:rPr lang="en-US" dirty="0"/>
-              <a:t> m=0; m &lt; </a:t>
-            </a:r>
-            <a:r>
-              <a:rPr lang="en-US" dirty="0" err="1"/>
-              <a:t>num_tiles</a:t>
-            </a:r>
-            <a:r>
-              <a:rPr lang="en-US" dirty="0"/>
-              <a:t>; m++) {</a:t>
-            </a:r>
-          </a:p>
-          <a:p>
-            <a:pPr marL="0" indent="0">
-              <a:buNone/>
-            </a:pPr>
-            <a:r>
-              <a:rPr lang="en-US" dirty="0"/>
-              <a:t>		…</a:t>
-            </a:r>
-          </a:p>
-          <a:p>
-            <a:pPr marL="0" indent="0">
-              <a:buNone/>
-            </a:pPr>
-            <a:r>
-              <a:rPr lang="en-US" dirty="0"/>
-              <a:t>	}</a:t>
-            </a:r>
-          </a:p>
-          <a:p>
-            <a:pPr marL="0" indent="0">
-              <a:buNone/>
-            </a:pPr>
-            <a:endParaRPr lang="en-US" dirty="0"/>
-          </a:p>
-          <a:p>
-            <a:pPr marL="0" indent="0">
-              <a:buNone/>
-            </a:pPr>
-            <a:r>
-              <a:rPr lang="en-US" dirty="0"/>
-              <a:t>	if (row &lt; width &amp;&amp; col &lt; width)</a:t>
-            </a:r>
-          </a:p>
-          <a:p>
-            <a:pPr marL="0" indent="0">
-              <a:buNone/>
-            </a:pPr>
-            <a:r>
-              <a:rPr lang="en-US" dirty="0"/>
-              <a:t>		</a:t>
-            </a:r>
-            <a:r>
-              <a:rPr lang="en-US" dirty="0" err="1"/>
-              <a:t>Pd</a:t>
-            </a:r>
-            <a:r>
-              <a:rPr lang="en-US" dirty="0"/>
-              <a:t>[row*</a:t>
-            </a:r>
-            <a:r>
-              <a:rPr lang="en-US" dirty="0" err="1"/>
-              <a:t>width+col</a:t>
-            </a:r>
-            <a:r>
-              <a:rPr lang="en-US" dirty="0"/>
-              <a:t>] = </a:t>
-            </a:r>
-            <a:r>
-              <a:rPr lang="en-US" dirty="0" err="1"/>
-              <a:t>tmp</a:t>
-            </a:r>
-            <a:r>
-              <a:rPr lang="en-US" dirty="0"/>
-              <a:t>;</a:t>
-            </a:r>
-          </a:p>
-          <a:p>
-            <a:pPr marL="0" indent="0">
-              <a:buNone/>
-            </a:pPr>
-            <a:r>
-              <a:rPr lang="en-US" dirty="0"/>
-              <a:t>}</a:t>
-            </a:r>
-          </a:p>
-        </p:txBody>
-      </p:sp>
-      <p:sp>
-        <p:nvSpPr>
-          <p:cNvPr id="5" name="TextBox 4">
-            <a:extLst>
-              <a:ext uri="{FF2B5EF4-FFF2-40B4-BE49-F238E27FC236}">
-                <a16:creationId xmlns:a16="http://schemas.microsoft.com/office/drawing/2014/main" id="{7841AAF2-D420-8A4D-BE45-10458CEE63CF}"/>
-              </a:ext>
-            </a:extLst>
-          </p:cNvPr>
-          <p:cNvSpPr txBox="1"/>
-          <p:nvPr/>
-        </p:nvSpPr>
-        <p:spPr>
-          <a:xfrm>
-            <a:off x="7141198" y="4143858"/>
-            <a:ext cx="4443919" cy="954107"/>
-          </a:xfrm>
-          <a:prstGeom prst="rect">
-            <a:avLst/>
-          </a:prstGeom>
-          <a:noFill/>
-        </p:spPr>
-        <p:txBody>
-          <a:bodyPr wrap="square" rtlCol="0">
-            <a:spAutoFit/>
-          </a:bodyPr>
-          <a:lstStyle/>
-          <a:p>
-            <a:r>
-              <a:rPr lang="en-US" sz="2800" dirty="0"/>
-              <a:t>Step 4: Write the value into </a:t>
-            </a:r>
-          </a:p>
-          <a:p>
-            <a:r>
-              <a:rPr lang="en-US" sz="2800" dirty="0"/>
-              <a:t>       the appropriate cell  </a:t>
-            </a:r>
-          </a:p>
-        </p:txBody>
-      </p:sp>
-      <p:sp>
-        <p:nvSpPr>
-          <p:cNvPr id="6" name="TextBox 5">
-            <a:extLst>
-              <a:ext uri="{FF2B5EF4-FFF2-40B4-BE49-F238E27FC236}">
-                <a16:creationId xmlns:a16="http://schemas.microsoft.com/office/drawing/2014/main" id="{D19C86A2-9DA0-DE4F-A8A0-AC0F1A1E6D84}"/>
-              </a:ext>
-            </a:extLst>
-          </p:cNvPr>
-          <p:cNvSpPr txBox="1"/>
-          <p:nvPr/>
-        </p:nvSpPr>
-        <p:spPr>
-          <a:xfrm>
-            <a:off x="6596763" y="3965732"/>
-            <a:ext cx="775752" cy="1200329"/>
-          </a:xfrm>
-          <a:prstGeom prst="rect">
-            <a:avLst/>
-          </a:prstGeom>
-          <a:noFill/>
-        </p:spPr>
-        <p:txBody>
-          <a:bodyPr wrap="square" rtlCol="0">
-            <a:spAutoFit/>
-          </a:bodyPr>
-          <a:lstStyle/>
-          <a:p>
-            <a:r>
-              <a:rPr lang="en-US" sz="7200" dirty="0"/>
-              <a:t>}</a:t>
-            </a:r>
-          </a:p>
-        </p:txBody>
-      </p:sp>
-    </p:spTree>
-    <p:extLst>
-      <p:ext uri="{BB962C8B-B14F-4D97-AF65-F5344CB8AC3E}">
-        <p14:creationId xmlns:p14="http://schemas.microsoft.com/office/powerpoint/2010/main" val="2579129963"/>
-      </p:ext>
-    </p:extLst>
-  </p:cSld>
-  <p:clrMapOvr>
-    <a:masterClrMapping/>
-  </p:clrMapOvr>
-</p:sld>
-</file>
-
 <file path=ppt/slides/slide15.xml><?xml version="1.0" encoding="utf-8"?>
 <p:sld xmlns:a="http://schemas.openxmlformats.org/drawingml/2006/main" xmlns:r="http://schemas.openxmlformats.org/officeDocument/2006/relationships" xmlns:p="http://schemas.openxmlformats.org/presentationml/2006/main">
   <p:cSld>
@@ -8932,7 +8834,7 @@
           <p:cNvPr id="2" name="Title 1">
             <a:extLst>
               <a:ext uri="{FF2B5EF4-FFF2-40B4-BE49-F238E27FC236}">
-                <a16:creationId xmlns:a16="http://schemas.microsoft.com/office/drawing/2014/main" id="{234E1D21-93D1-1240-8976-FF4A2FD3B40E}"/>
+                <a16:creationId xmlns:a16="http://schemas.microsoft.com/office/drawing/2014/main" id="{CFB17853-D43F-0548-9D80-3FC9AA31533C}"/>
               </a:ext>
             </a:extLst>
           </p:cNvPr>
@@ -8951,46 +8853,188 @@
             <a:pPr algn="ctr"/>
             <a:r>
               <a:rPr lang="en-US" dirty="0"/>
-              <a:t>Performance results</a:t>
+              <a:t>Writing the tiled kernel</a:t>
             </a:r>
           </a:p>
         </p:txBody>
       </p:sp>
-      <p:pic>
-        <p:nvPicPr>
-          <p:cNvPr id="5" name="Content Placeholder 4">
-            <a:extLst>
-              <a:ext uri="{FF2B5EF4-FFF2-40B4-BE49-F238E27FC236}">
-                <a16:creationId xmlns:a16="http://schemas.microsoft.com/office/drawing/2014/main" id="{EC473541-5F95-CA49-B4A2-A93C606E9EA8}"/>
-              </a:ext>
-            </a:extLst>
-          </p:cNvPr>
-          <p:cNvPicPr>
-            <a:picLocks noGrp="1" noChangeAspect="1"/>
-          </p:cNvPicPr>
+      <p:sp>
+        <p:nvSpPr>
+          <p:cNvPr id="3" name="Content Placeholder 2">
+            <a:extLst>
+              <a:ext uri="{FF2B5EF4-FFF2-40B4-BE49-F238E27FC236}">
+                <a16:creationId xmlns:a16="http://schemas.microsoft.com/office/drawing/2014/main" id="{FA8D2203-C3AE-B24F-9E96-F0A4533F2282}"/>
+              </a:ext>
+            </a:extLst>
+          </p:cNvPr>
+          <p:cNvSpPr>
+            <a:spLocks noGrp="1"/>
+          </p:cNvSpPr>
           <p:nvPr>
             <p:ph idx="1"/>
           </p:nvPr>
-        </p:nvPicPr>
-        <p:blipFill>
-          <a:blip r:embed="rId2"/>
-          <a:stretch>
-            <a:fillRect/>
-          </a:stretch>
-        </p:blipFill>
+        </p:nvSpPr>
         <p:spPr>
           <a:xfrm>
-            <a:off x="1981200" y="1318636"/>
-            <a:ext cx="8229600" cy="4949475"/>
+            <a:off x="838200" y="1825625"/>
+            <a:ext cx="10515600" cy="3846755"/>
           </a:xfrm>
         </p:spPr>
-      </p:pic>
+        <p:txBody>
+          <a:bodyPr>
+            <a:normAutofit fontScale="92500" lnSpcReduction="20000"/>
+          </a:bodyPr>
+          <a:lstStyle/>
+          <a:p>
+            <a:pPr marL="0" indent="0">
+              <a:buNone/>
+            </a:pPr>
+            <a:r>
+              <a:rPr lang="en-US" dirty="0"/>
+              <a:t>__global__ void </a:t>
+            </a:r>
+            <a:r>
+              <a:rPr lang="en-US" dirty="0" err="1"/>
+              <a:t>tiledkernel</a:t>
+            </a:r>
+            <a:r>
+              <a:rPr lang="en-US" dirty="0"/>
+              <a:t>(float* Md, float* Nd, float* </a:t>
+            </a:r>
+            <a:r>
+              <a:rPr lang="en-US" dirty="0" err="1"/>
+              <a:t>Pd</a:t>
+            </a:r>
+            <a:r>
+              <a:rPr lang="en-US" dirty="0"/>
+              <a:t>, </a:t>
+            </a:r>
+            <a:r>
+              <a:rPr lang="en-US" dirty="0" err="1"/>
+              <a:t>int</a:t>
+            </a:r>
+            <a:r>
+              <a:rPr lang="en-US" dirty="0"/>
+              <a:t> width) {</a:t>
+            </a:r>
+          </a:p>
+          <a:p>
+            <a:pPr marL="0" indent="0">
+              <a:buNone/>
+            </a:pPr>
+            <a:r>
+              <a:rPr lang="en-US" dirty="0"/>
+              <a:t>	…</a:t>
+            </a:r>
+          </a:p>
+          <a:p>
+            <a:pPr marL="0" indent="0">
+              <a:buNone/>
+            </a:pPr>
+            <a:r>
+              <a:rPr lang="en-US" dirty="0"/>
+              <a:t>	 for (</a:t>
+            </a:r>
+            <a:r>
+              <a:rPr lang="en-US" dirty="0" err="1"/>
+              <a:t>int</a:t>
+            </a:r>
+            <a:r>
+              <a:rPr lang="en-US" dirty="0"/>
+              <a:t> m=0; m &lt; </a:t>
+            </a:r>
+            <a:r>
+              <a:rPr lang="en-US" dirty="0" err="1"/>
+              <a:t>num_tiles</a:t>
+            </a:r>
+            <a:r>
+              <a:rPr lang="en-US" dirty="0"/>
+              <a:t>; m++) {</a:t>
+            </a:r>
+          </a:p>
+          <a:p>
+            <a:pPr marL="0" indent="0">
+              <a:buNone/>
+            </a:pPr>
+            <a:r>
+              <a:rPr lang="en-US" dirty="0"/>
+              <a:t>		…</a:t>
+            </a:r>
+          </a:p>
+          <a:p>
+            <a:pPr marL="0" indent="0">
+              <a:buNone/>
+            </a:pPr>
+            <a:r>
+              <a:rPr lang="en-US" dirty="0"/>
+              <a:t>	}</a:t>
+            </a:r>
+          </a:p>
+          <a:p>
+            <a:pPr marL="0" indent="0">
+              <a:buNone/>
+            </a:pPr>
+            <a:endParaRPr lang="en-US" dirty="0"/>
+          </a:p>
+          <a:p>
+            <a:pPr marL="0" indent="0">
+              <a:buNone/>
+            </a:pPr>
+            <a:r>
+              <a:rPr lang="en-US" dirty="0"/>
+              <a:t>	if (row &lt; width &amp;&amp; col &lt; width)</a:t>
+            </a:r>
+          </a:p>
+          <a:p>
+            <a:pPr marL="0" indent="0">
+              <a:buNone/>
+            </a:pPr>
+            <a:r>
+              <a:rPr lang="en-US" dirty="0"/>
+              <a:t>		</a:t>
+            </a:r>
+            <a:r>
+              <a:rPr lang="en-US" dirty="0" err="1"/>
+              <a:t>Pd</a:t>
+            </a:r>
+            <a:r>
+              <a:rPr lang="en-US" dirty="0"/>
+              <a:t>[row*</a:t>
+            </a:r>
+            <a:r>
+              <a:rPr lang="en-US" dirty="0" err="1"/>
+              <a:t>width+col</a:t>
+            </a:r>
+            <a:r>
+              <a:rPr lang="en-US" dirty="0"/>
+              <a:t>] = </a:t>
+            </a:r>
+            <a:r>
+              <a:rPr lang="en-US" dirty="0" err="1"/>
+              <a:t>tmp</a:t>
+            </a:r>
+            <a:r>
+              <a:rPr lang="en-US" dirty="0"/>
+              <a:t>;</a:t>
+            </a:r>
+          </a:p>
+          <a:p>
+            <a:pPr marL="0" indent="0">
+              <a:buNone/>
+            </a:pPr>
+            <a:r>
+              <a:rPr lang="en-US" dirty="0"/>
+              <a:t>}</a:t>
+            </a:r>
+          </a:p>
+        </p:txBody>
+      </p:sp>
       <p:sp>
         <p:nvSpPr>
-          <p:cNvPr id="6" name="TextBox 5">
-            <a:extLst>
-              <a:ext uri="{FF2B5EF4-FFF2-40B4-BE49-F238E27FC236}">
-                <a16:creationId xmlns:a16="http://schemas.microsoft.com/office/drawing/2014/main" id="{5D17CA96-6926-3E46-847C-8584005CBFA1}"/>
+          <p:cNvPr id="5" name="TextBox 4">
+            <a:extLst>
+              <a:ext uri="{FF2B5EF4-FFF2-40B4-BE49-F238E27FC236}">
+                <a16:creationId xmlns:a16="http://schemas.microsoft.com/office/drawing/2014/main" id="{7841AAF2-D420-8A4D-BE45-10458CEE63CF}"/>
               </a:ext>
             </a:extLst>
           </p:cNvPr>
@@ -8999,8 +9043,8 @@
         </p:nvSpPr>
         <p:spPr>
           <a:xfrm>
-            <a:off x="3440624" y="6206119"/>
-            <a:ext cx="5684313" cy="369332"/>
+            <a:off x="7141198" y="4143858"/>
+            <a:ext cx="4443919" cy="954107"/>
           </a:xfrm>
           <a:prstGeom prst="rect">
             <a:avLst/>
@@ -9008,14 +9052,55 @@
           <a:noFill/>
         </p:spPr>
         <p:txBody>
-          <a:bodyPr wrap="none" rtlCol="0">
+          <a:bodyPr wrap="square" rtlCol="0">
             <a:spAutoFit/>
           </a:bodyPr>
           <a:lstStyle/>
           <a:p>
             <a:r>
-              <a:rPr lang="en-US" dirty="0"/>
-              <a:t>Speed-up = Time for untiled version / time for tiled version</a:t>
+              <a:rPr lang="en-US" sz="2800" dirty="0"/>
+              <a:t>Step 4: Write the value into </a:t>
+            </a:r>
+          </a:p>
+          <a:p>
+            <a:r>
+              <a:rPr lang="en-US" sz="2800" dirty="0"/>
+              <a:t>       the appropriate cell  </a:t>
+            </a:r>
+          </a:p>
+        </p:txBody>
+      </p:sp>
+      <p:sp>
+        <p:nvSpPr>
+          <p:cNvPr id="6" name="TextBox 5">
+            <a:extLst>
+              <a:ext uri="{FF2B5EF4-FFF2-40B4-BE49-F238E27FC236}">
+                <a16:creationId xmlns:a16="http://schemas.microsoft.com/office/drawing/2014/main" id="{D19C86A2-9DA0-DE4F-A8A0-AC0F1A1E6D84}"/>
+              </a:ext>
+            </a:extLst>
+          </p:cNvPr>
+          <p:cNvSpPr txBox="1"/>
+          <p:nvPr/>
+        </p:nvSpPr>
+        <p:spPr>
+          <a:xfrm>
+            <a:off x="6596763" y="3965732"/>
+            <a:ext cx="775752" cy="1200329"/>
+          </a:xfrm>
+          <a:prstGeom prst="rect">
+            <a:avLst/>
+          </a:prstGeom>
+          <a:noFill/>
+        </p:spPr>
+        <p:txBody>
+          <a:bodyPr wrap="square" rtlCol="0">
+            <a:spAutoFit/>
+          </a:bodyPr>
+          <a:lstStyle/>
+          <a:p>
+            <a:r>
+              <a:rPr lang="en-US" sz="7200" dirty="0"/>
+              <a:t>}</a:t>
             </a:r>
           </a:p>
         </p:txBody>
@@ -9023,7 +9108,7 @@
     </p:spTree>
     <p:extLst>
       <p:ext uri="{BB962C8B-B14F-4D97-AF65-F5344CB8AC3E}">
-        <p14:creationId xmlns:p14="http://schemas.microsoft.com/office/powerpoint/2010/main" val="896562520"/>
+        <p14:creationId xmlns:p14="http://schemas.microsoft.com/office/powerpoint/2010/main" val="2579129963"/>
       </p:ext>
     </p:extLst>
   </p:cSld>
@@ -13278,7 +13363,7 @@
           <p:cNvPr id="2" name="Title 1">
             <a:extLst>
               <a:ext uri="{FF2B5EF4-FFF2-40B4-BE49-F238E27FC236}">
-                <a16:creationId xmlns:a16="http://schemas.microsoft.com/office/drawing/2014/main" id="{CFB17853-D43F-0548-9D80-3FC9AA31533C}"/>
+                <a16:creationId xmlns:a16="http://schemas.microsoft.com/office/drawing/2014/main" id="{234E1D21-93D1-1240-8976-FF4A2FD3B40E}"/>
               </a:ext>
             </a:extLst>
           </p:cNvPr>
@@ -13297,131 +13382,46 @@
             <a:pPr algn="ctr"/>
             <a:r>
               <a:rPr lang="en-US" dirty="0"/>
-              <a:t>Writing the tiled kernel</a:t>
+              <a:t>Performance results</a:t>
             </a:r>
           </a:p>
         </p:txBody>
       </p:sp>
-      <p:sp>
-        <p:nvSpPr>
-          <p:cNvPr id="3" name="Content Placeholder 2">
-            <a:extLst>
-              <a:ext uri="{FF2B5EF4-FFF2-40B4-BE49-F238E27FC236}">
-                <a16:creationId xmlns:a16="http://schemas.microsoft.com/office/drawing/2014/main" id="{FA8D2203-C3AE-B24F-9E96-F0A4533F2282}"/>
-              </a:ext>
-            </a:extLst>
-          </p:cNvPr>
-          <p:cNvSpPr>
-            <a:spLocks noGrp="1"/>
-          </p:cNvSpPr>
+      <p:pic>
+        <p:nvPicPr>
+          <p:cNvPr id="5" name="Content Placeholder 4">
+            <a:extLst>
+              <a:ext uri="{FF2B5EF4-FFF2-40B4-BE49-F238E27FC236}">
+                <a16:creationId xmlns:a16="http://schemas.microsoft.com/office/drawing/2014/main" id="{EC473541-5F95-CA49-B4A2-A93C606E9EA8}"/>
+              </a:ext>
+            </a:extLst>
+          </p:cNvPr>
+          <p:cNvPicPr>
+            <a:picLocks noGrp="1" noChangeAspect="1"/>
+          </p:cNvPicPr>
           <p:nvPr>
             <p:ph idx="1"/>
           </p:nvPr>
-        </p:nvSpPr>
+        </p:nvPicPr>
+        <p:blipFill>
+          <a:blip r:embed="rId2"/>
+          <a:stretch>
+            <a:fillRect/>
+          </a:stretch>
+        </p:blipFill>
         <p:spPr>
           <a:xfrm>
-            <a:off x="838200" y="1825625"/>
-            <a:ext cx="10515600" cy="2963351"/>
+            <a:off x="1981200" y="1318636"/>
+            <a:ext cx="8229600" cy="4949475"/>
           </a:xfrm>
         </p:spPr>
-        <p:txBody>
-          <a:bodyPr>
-            <a:normAutofit/>
-          </a:bodyPr>
-          <a:lstStyle/>
-          <a:p>
-            <a:pPr marL="0" indent="0">
-              <a:buNone/>
-            </a:pPr>
-            <a:r>
-              <a:rPr lang="en-US" dirty="0"/>
-              <a:t>__global__ void </a:t>
-            </a:r>
-            <a:r>
-              <a:rPr lang="en-US" dirty="0" err="1"/>
-              <a:t>tiledkernel</a:t>
-            </a:r>
-            <a:r>
-              <a:rPr lang="en-US" dirty="0"/>
-              <a:t>(float* Md, float* Nd, float* </a:t>
-            </a:r>
-            <a:r>
-              <a:rPr lang="en-US" dirty="0" err="1"/>
-              <a:t>Pd</a:t>
-            </a:r>
-            <a:r>
-              <a:rPr lang="en-US" dirty="0"/>
-              <a:t>, </a:t>
-            </a:r>
-            <a:r>
-              <a:rPr lang="en-US" dirty="0" err="1"/>
-              <a:t>int</a:t>
-            </a:r>
-            <a:r>
-              <a:rPr lang="en-US" dirty="0"/>
-              <a:t> width) {</a:t>
-            </a:r>
-          </a:p>
-          <a:p>
-            <a:pPr marL="0" indent="0">
-              <a:buNone/>
-            </a:pPr>
-            <a:r>
-              <a:rPr lang="en-US" dirty="0"/>
-              <a:t>	__shared__ float </a:t>
-            </a:r>
-            <a:r>
-              <a:rPr lang="en-US" dirty="0" err="1"/>
-              <a:t>Mds</a:t>
-            </a:r>
-            <a:r>
-              <a:rPr lang="en-US" dirty="0"/>
-              <a:t>[TILE_WIDTH][TILE_WIDTH];</a:t>
-            </a:r>
-          </a:p>
-          <a:p>
-            <a:pPr marL="0" indent="0">
-              <a:buNone/>
-            </a:pPr>
-            <a:r>
-              <a:rPr lang="en-US" dirty="0"/>
-              <a:t>	__shared__ float </a:t>
-            </a:r>
-            <a:r>
-              <a:rPr lang="en-US" dirty="0" err="1"/>
-              <a:t>Nds</a:t>
-            </a:r>
-            <a:r>
-              <a:rPr lang="en-US" dirty="0"/>
-              <a:t>[TILE_WIDTH][TILE_WIDTH];</a:t>
-            </a:r>
-          </a:p>
-          <a:p>
-            <a:pPr marL="0" indent="0">
-              <a:buNone/>
-            </a:pPr>
-            <a:r>
-              <a:rPr lang="en-US" dirty="0"/>
-              <a:t>	…</a:t>
-            </a:r>
-          </a:p>
-          <a:p>
-            <a:pPr marL="0" indent="0">
-              <a:buNone/>
-            </a:pPr>
-            <a:r>
-              <a:rPr lang="en-US" dirty="0"/>
-              <a:t>}</a:t>
-            </a:r>
-          </a:p>
-        </p:txBody>
-      </p:sp>
+      </p:pic>
       <p:sp>
         <p:nvSpPr>
-          <p:cNvPr id="5" name="TextBox 4">
-            <a:extLst>
-              <a:ext uri="{FF2B5EF4-FFF2-40B4-BE49-F238E27FC236}">
-                <a16:creationId xmlns:a16="http://schemas.microsoft.com/office/drawing/2014/main" id="{7841AAF2-D420-8A4D-BE45-10458CEE63CF}"/>
+          <p:cNvPr id="6" name="TextBox 5">
+            <a:extLst>
+              <a:ext uri="{FF2B5EF4-FFF2-40B4-BE49-F238E27FC236}">
+                <a16:creationId xmlns:a16="http://schemas.microsoft.com/office/drawing/2014/main" id="{5D17CA96-6926-3E46-847C-8584005CBFA1}"/>
               </a:ext>
             </a:extLst>
           </p:cNvPr>
@@ -13430,8 +13430,8 @@
         </p:nvSpPr>
         <p:spPr>
           <a:xfrm>
-            <a:off x="838200" y="5373364"/>
-            <a:ext cx="8192884" cy="523220"/>
+            <a:off x="3440624" y="6206119"/>
+            <a:ext cx="5684313" cy="369332"/>
           </a:xfrm>
           <a:prstGeom prst="rect">
             <a:avLst/>
@@ -13445,8 +13445,8 @@
           <a:lstStyle/>
           <a:p>
             <a:r>
-              <a:rPr lang="en-US" sz="2800" dirty="0"/>
-              <a:t>Step 1: Allocate the cache to store a tile of each matrix </a:t>
+              <a:rPr lang="en-US" dirty="0"/>
+              <a:t>Speed-up = Time for untiled version / time for tiled version</a:t>
             </a:r>
           </a:p>
         </p:txBody>
@@ -13454,7 +13454,7 @@
     </p:spTree>
     <p:extLst>
       <p:ext uri="{BB962C8B-B14F-4D97-AF65-F5344CB8AC3E}">
-        <p14:creationId xmlns:p14="http://schemas.microsoft.com/office/powerpoint/2010/main" val="2166518724"/>
+        <p14:creationId xmlns:p14="http://schemas.microsoft.com/office/powerpoint/2010/main" val="896562520"/>
       </p:ext>
     </p:extLst>
   </p:cSld>

</xml_diff>